<commit_message>
change fill color -> change shape color
</commit_message>
<xml_diff>
--- a/output/motiongo科技1_new.pptx
+++ b/output/motiongo科技1_new.pptx
@@ -11033,22 +11033,20 @@
           <a:gradFill rotWithShape="1">
             <a:gsLst>
               <a:gs pos="0">
-                <a:srgbClr val="EEFFFD">
+                <a:srgbClr val="000000">
                   <a:alpha val="0"/>
                 </a:srgbClr>
               </a:gs>
               <a:gs pos="100000">
-                <a:srgbClr val="00BCA7">
+                <a:srgbClr val="000000">
                   <a:alpha val="0"/>
                 </a:srgbClr>
               </a:gs>
             </a:gsLst>
-            <a:lin scaled="0"/>
+            <a:lin scaled="0" ang="16200000"/>
           </a:gradFill>
           <a:ln>
-            <a:solidFill>
-              <a:srgbClr val="00BCA7"/>
-            </a:solidFill>
+            <a:noFill/>
           </a:ln>
         </p:spPr>
         <p:style>
@@ -11217,9 +11215,7 @@
             <a:tileRect/>
           </a:gradFill>
           <a:ln>
-            <a:solidFill>
-              <a:srgbClr val="00BCA7"/>
-            </a:solidFill>
+            <a:noFill/>
           </a:ln>
         </p:spPr>
         <p:style>
@@ -11399,9 +11395,7 @@
             </a:path>
           </a:gradFill>
           <a:ln>
-            <a:solidFill>
-              <a:srgbClr val="00BCA7"/>
-            </a:solidFill>
+            <a:noFill/>
           </a:ln>
         </p:spPr>
         <p:style>
@@ -11559,9 +11553,7 @@
             </a:pathLst>
           </a:custGeom>
           <a:ln>
-            <a:solidFill>
-              <a:srgbClr val="00BCA7"/>
-            </a:solidFill>
+            <a:noFill/>
           </a:ln>
         </p:spPr>
         <p:style>
@@ -11698,9 +11690,7 @@
             <a:tileRect/>
           </a:gradFill>
           <a:ln>
-            <a:solidFill>
-              <a:srgbClr val="00BCA7"/>
-            </a:solidFill>
+            <a:noFill/>
           </a:ln>
           <a:effectLst/>
         </p:spPr>
@@ -11851,9 +11841,7 @@
             <a:lin ang="5400000" scaled="0"/>
           </a:gradFill>
           <a:ln>
-            <a:solidFill>
-              <a:srgbClr val="00BCA7"/>
-            </a:solidFill>
+            <a:noFill/>
           </a:ln>
         </p:spPr>
         <p:style>
@@ -11906,22 +11894,20 @@
           <a:gradFill rotWithShape="1">
             <a:gsLst>
               <a:gs pos="0">
-                <a:srgbClr val="EEFFFD">
+                <a:srgbClr val="000000">
                   <a:alpha val="0"/>
                 </a:srgbClr>
               </a:gs>
               <a:gs pos="100000">
-                <a:srgbClr val="00BCA7">
+                <a:srgbClr val="000000">
                   <a:alpha val="0"/>
                 </a:srgbClr>
               </a:gs>
             </a:gsLst>
-            <a:lin scaled="0"/>
+            <a:lin scaled="0" ang="16200000"/>
           </a:gradFill>
           <a:ln>
-            <a:solidFill>
-              <a:srgbClr val="00BCA7"/>
-            </a:solidFill>
+            <a:noFill/>
           </a:ln>
         </p:spPr>
         <p:style>
@@ -11968,22 +11954,20 @@
           <a:gradFill rotWithShape="1">
             <a:gsLst>
               <a:gs pos="0">
-                <a:srgbClr val="EEFFFD">
+                <a:srgbClr val="000000">
                   <a:alpha val="0"/>
                 </a:srgbClr>
               </a:gs>
               <a:gs pos="100000">
-                <a:srgbClr val="00BCA7">
+                <a:srgbClr val="000000">
                   <a:alpha val="0"/>
                 </a:srgbClr>
               </a:gs>
             </a:gsLst>
-            <a:lin scaled="0"/>
+            <a:lin scaled="0" ang="16200000"/>
           </a:gradFill>
           <a:ln>
-            <a:solidFill>
-              <a:srgbClr val="00BCA7"/>
-            </a:solidFill>
+            <a:noFill/>
           </a:ln>
           <a:effectLst>
             <a:outerShdw blurRad="292100" dist="76200" dir="2700000" sx="98000" sy="98000" algn="tl" rotWithShape="0">
@@ -12046,9 +12030,7 @@
           </a:prstGeom>
           <a:noFill/>
           <a:ln>
-            <a:solidFill>
-              <a:srgbClr val="00BCA7"/>
-            </a:solidFill>
+            <a:noFill/>
           </a:ln>
           <a:effectLst>
             <a:outerShdw blurRad="292100" dist="76200" dir="2700000" sx="98000" sy="98000" algn="tl" rotWithShape="0">
@@ -12088,7 +12070,7 @@
             <a:r>
               <a:rPr lang="zh-CN" altLang="en-US" sz="1600">
                 <a:solidFill>
-                  <a:srgbClr val="00584E"/>
+                  <a:srgbClr val="000000"/>
                 </a:solidFill>
                 <a:latin typeface="+mj-ea"/>
                 <a:ea typeface="+mj-ea"/>
@@ -12141,9 +12123,21 @@
             </a:prstGeom>
             <a:noFill/>
             <a:ln>
-              <a:solidFill>
-                <a:srgbClr val="00BCA7"/>
-              </a:solidFill>
+              <a:gradFill>
+                <a:gsLst>
+                  <a:gs pos="0">
+                    <a:schemeClr val="accent1">
+                      <a:alpha val="70000"/>
+                    </a:schemeClr>
+                  </a:gs>
+                  <a:gs pos="4000">
+                    <a:schemeClr val="accent1">
+                      <a:alpha val="0"/>
+                    </a:schemeClr>
+                  </a:gs>
+                </a:gsLst>
+                <a:lin ang="5400000" scaled="1"/>
+              </a:gradFill>
               <a:prstDash val="dash"/>
             </a:ln>
           </p:spPr>
@@ -12194,9 +12188,21 @@
             </a:prstGeom>
             <a:noFill/>
             <a:ln>
-              <a:solidFill>
-                <a:srgbClr val="00BCA7"/>
-              </a:solidFill>
+              <a:gradFill>
+                <a:gsLst>
+                  <a:gs pos="0">
+                    <a:schemeClr val="accent1">
+                      <a:alpha val="70000"/>
+                    </a:schemeClr>
+                  </a:gs>
+                  <a:gs pos="4000">
+                    <a:schemeClr val="accent1">
+                      <a:alpha val="0"/>
+                    </a:schemeClr>
+                  </a:gs>
+                </a:gsLst>
+                <a:lin ang="5400000" scaled="1"/>
+              </a:gradFill>
               <a:prstDash val="dash"/>
             </a:ln>
           </p:spPr>
@@ -12247,9 +12253,21 @@
             </a:prstGeom>
             <a:noFill/>
             <a:ln>
-              <a:solidFill>
-                <a:srgbClr val="00BCA7"/>
-              </a:solidFill>
+              <a:gradFill>
+                <a:gsLst>
+                  <a:gs pos="0">
+                    <a:schemeClr val="accent1">
+                      <a:alpha val="70000"/>
+                    </a:schemeClr>
+                  </a:gs>
+                  <a:gs pos="4000">
+                    <a:schemeClr val="accent1">
+                      <a:alpha val="0"/>
+                    </a:schemeClr>
+                  </a:gs>
+                </a:gsLst>
+                <a:lin ang="5400000" scaled="1"/>
+              </a:gradFill>
               <a:prstDash val="dash"/>
             </a:ln>
           </p:spPr>
@@ -12300,9 +12318,21 @@
             </a:prstGeom>
             <a:noFill/>
             <a:ln>
-              <a:solidFill>
-                <a:srgbClr val="00BCA7"/>
-              </a:solidFill>
+              <a:gradFill>
+                <a:gsLst>
+                  <a:gs pos="0">
+                    <a:schemeClr val="accent1">
+                      <a:alpha val="70000"/>
+                    </a:schemeClr>
+                  </a:gs>
+                  <a:gs pos="4000">
+                    <a:schemeClr val="accent1">
+                      <a:alpha val="0"/>
+                    </a:schemeClr>
+                  </a:gs>
+                </a:gsLst>
+                <a:lin ang="5400000" scaled="1"/>
+              </a:gradFill>
               <a:prstDash val="dash"/>
             </a:ln>
           </p:spPr>
@@ -12350,9 +12380,25 @@
           </a:prstGeom>
           <a:noFill/>
           <a:ln cap="rnd">
-            <a:solidFill>
-              <a:srgbClr val="00BCA7"/>
-            </a:solidFill>
+            <a:gradFill flip="none" rotWithShape="1">
+              <a:gsLst>
+                <a:gs pos="10000">
+                  <a:schemeClr val="accent1">
+                    <a:lumMod val="60000"/>
+                    <a:lumOff val="40000"/>
+                    <a:alpha val="0"/>
+                  </a:schemeClr>
+                </a:gs>
+                <a:gs pos="49000">
+                  <a:schemeClr val="accent1">
+                    <a:lumMod val="60000"/>
+                    <a:lumOff val="40000"/>
+                  </a:schemeClr>
+                </a:gs>
+              </a:gsLst>
+              <a:lin ang="0" scaled="1"/>
+              <a:tileRect/>
+            </a:gradFill>
             <a:prstDash val="solid"/>
           </a:ln>
         </p:spPr>
@@ -12422,9 +12468,7 @@
             <a:lin ang="18900000" scaled="1"/>
           </a:gradFill>
           <a:ln>
-            <a:solidFill>
-              <a:srgbClr val="00BCA7"/>
-            </a:solidFill>
+            <a:noFill/>
           </a:ln>
         </p:spPr>
         <p:style>
@@ -12477,22 +12521,20 @@
           <a:gradFill rotWithShape="1">
             <a:gsLst>
               <a:gs pos="0">
-                <a:srgbClr val="EEFFFD">
+                <a:srgbClr val="000000">
                   <a:alpha val="0"/>
                 </a:srgbClr>
               </a:gs>
               <a:gs pos="100000">
-                <a:srgbClr val="00BCA7">
+                <a:srgbClr val="000000">
                   <a:alpha val="0"/>
                 </a:srgbClr>
               </a:gs>
             </a:gsLst>
-            <a:lin scaled="0"/>
+            <a:lin scaled="0" ang="16200000"/>
           </a:gradFill>
           <a:ln>
-            <a:solidFill>
-              <a:srgbClr val="00BCA7"/>
-            </a:solidFill>
+            <a:noFill/>
           </a:ln>
           <a:effectLst>
             <a:outerShdw blurRad="368300" dist="127000" dir="2400000" sx="98000" sy="98000" algn="tl" rotWithShape="0">
@@ -12549,22 +12591,20 @@
           <a:gradFill rotWithShape="1">
             <a:gsLst>
               <a:gs pos="0">
-                <a:srgbClr val="EEFFFD">
+                <a:srgbClr val="000000">
                   <a:alpha val="0"/>
                 </a:srgbClr>
               </a:gs>
               <a:gs pos="100000">
-                <a:srgbClr val="00BCA7">
+                <a:srgbClr val="000000">
                   <a:alpha val="0"/>
                 </a:srgbClr>
               </a:gs>
             </a:gsLst>
-            <a:lin scaled="0"/>
+            <a:lin scaled="0" ang="16200000"/>
           </a:gradFill>
           <a:ln>
-            <a:solidFill>
-              <a:srgbClr val="00BCA7"/>
-            </a:solidFill>
+            <a:noFill/>
           </a:ln>
           <a:effectLst>
             <a:outerShdw blurRad="368300" dist="127000" dir="2400000" sx="98000" sy="98000" algn="tl" rotWithShape="0">
@@ -12629,22 +12669,20 @@
           <a:gradFill rotWithShape="1">
             <a:gsLst>
               <a:gs pos="0">
-                <a:srgbClr val="EEFFFD">
+                <a:srgbClr val="000000">
                   <a:alpha val="0"/>
                 </a:srgbClr>
               </a:gs>
               <a:gs pos="100000">
-                <a:srgbClr val="00BCA7">
+                <a:srgbClr val="000000">
                   <a:alpha val="0"/>
                 </a:srgbClr>
               </a:gs>
             </a:gsLst>
-            <a:lin scaled="0"/>
+            <a:lin scaled="0" ang="16200000"/>
           </a:gradFill>
           <a:ln>
-            <a:solidFill>
-              <a:srgbClr val="00BCA7"/>
-            </a:solidFill>
+            <a:noFill/>
           </a:ln>
           <a:effectLst>
             <a:outerShdw blurRad="292100" dist="76200" dir="2700000" sx="98000" sy="98000" algn="tl" rotWithShape="0">
@@ -12713,9 +12751,7 @@
           </a:prstGeom>
           <a:noFill/>
           <a:ln>
-            <a:solidFill>
-              <a:srgbClr val="00BCA7"/>
-            </a:solidFill>
+            <a:noFill/>
           </a:ln>
           <a:effectLst>
             <a:outerShdw blurRad="292100" dist="76200" dir="2700000" sx="98000" sy="98000" algn="tl" rotWithShape="0">
@@ -12755,7 +12791,7 @@
             <a:r>
               <a:rPr lang="zh-CN" altLang="en-US" sz="1600">
                 <a:solidFill>
-                  <a:srgbClr val="00584E"/>
+                  <a:srgbClr val="000000"/>
                 </a:solidFill>
                 <a:latin typeface="+mj-ea"/>
                 <a:ea typeface="+mj-ea"/>
@@ -12799,22 +12835,20 @@
           <a:gradFill rotWithShape="1">
             <a:gsLst>
               <a:gs pos="0">
-                <a:srgbClr val="EEFFFD">
+                <a:srgbClr val="000000">
                   <a:alpha val="0"/>
                 </a:srgbClr>
               </a:gs>
               <a:gs pos="100000">
-                <a:srgbClr val="00BCA7">
+                <a:srgbClr val="000000">
                   <a:alpha val="0"/>
                 </a:srgbClr>
               </a:gs>
             </a:gsLst>
-            <a:lin scaled="0"/>
+            <a:lin scaled="0" ang="16200000"/>
           </a:gradFill>
           <a:ln>
-            <a:solidFill>
-              <a:srgbClr val="00BCA7"/>
-            </a:solidFill>
+            <a:noFill/>
           </a:ln>
           <a:effectLst>
             <a:outerShdw blurRad="292100" dist="76200" dir="2700000" sx="98000" sy="98000" algn="tl" rotWithShape="0">
@@ -12883,9 +12917,7 @@
           </a:prstGeom>
           <a:noFill/>
           <a:ln>
-            <a:solidFill>
-              <a:srgbClr val="00BCA7"/>
-            </a:solidFill>
+            <a:noFill/>
           </a:ln>
           <a:effectLst>
             <a:outerShdw blurRad="292100" dist="76200" dir="2700000" sx="98000" sy="98000" algn="tl" rotWithShape="0">
@@ -12925,7 +12957,7 @@
             <a:r>
               <a:rPr lang="zh-CN" altLang="en-US" sz="1600">
                 <a:solidFill>
-                  <a:srgbClr val="00584E"/>
+                  <a:srgbClr val="000000"/>
                 </a:solidFill>
                 <a:latin typeface="+mj-ea"/>
                 <a:ea typeface="+mj-ea"/>
@@ -12969,22 +13001,20 @@
           <a:gradFill rotWithShape="1">
             <a:gsLst>
               <a:gs pos="0">
-                <a:srgbClr val="EEFFFD">
+                <a:srgbClr val="000000">
                   <a:alpha val="0"/>
                 </a:srgbClr>
               </a:gs>
               <a:gs pos="100000">
-                <a:srgbClr val="00BCA7">
+                <a:srgbClr val="000000">
                   <a:alpha val="0"/>
                 </a:srgbClr>
               </a:gs>
             </a:gsLst>
-            <a:lin scaled="0"/>
+            <a:lin scaled="0" ang="16200000"/>
           </a:gradFill>
           <a:ln>
-            <a:solidFill>
-              <a:srgbClr val="00BCA7"/>
-            </a:solidFill>
+            <a:noFill/>
           </a:ln>
           <a:effectLst>
             <a:outerShdw blurRad="292100" dist="76200" dir="2700000" sx="98000" sy="98000" algn="tl" rotWithShape="0">
@@ -13053,9 +13083,7 @@
           </a:prstGeom>
           <a:noFill/>
           <a:ln>
-            <a:solidFill>
-              <a:srgbClr val="00BCA7"/>
-            </a:solidFill>
+            <a:noFill/>
           </a:ln>
           <a:effectLst>
             <a:outerShdw blurRad="292100" dist="76200" dir="2700000" sx="98000" sy="98000" algn="tl" rotWithShape="0">
@@ -13095,7 +13123,7 @@
             <a:r>
               <a:rPr lang="zh-CN" altLang="en-US" sz="1600">
                 <a:solidFill>
-                  <a:srgbClr val="00584E"/>
+                  <a:srgbClr val="000000"/>
                 </a:solidFill>
                 <a:latin typeface="+mj-ea"/>
                 <a:ea typeface="+mj-ea"/>
@@ -13139,22 +13167,20 @@
           <a:gradFill rotWithShape="1">
             <a:gsLst>
               <a:gs pos="0">
-                <a:srgbClr val="EEFFFD">
+                <a:srgbClr val="000000">
                   <a:alpha val="0"/>
                 </a:srgbClr>
               </a:gs>
               <a:gs pos="100000">
-                <a:srgbClr val="00BCA7">
+                <a:srgbClr val="000000">
                   <a:alpha val="0"/>
                 </a:srgbClr>
               </a:gs>
             </a:gsLst>
-            <a:lin scaled="0"/>
+            <a:lin scaled="0" ang="16200000"/>
           </a:gradFill>
           <a:ln>
-            <a:solidFill>
-              <a:srgbClr val="00BCA7"/>
-            </a:solidFill>
+            <a:noFill/>
           </a:ln>
           <a:effectLst>
             <a:outerShdw blurRad="292100" dist="76200" dir="2700000" sx="98000" sy="98000" algn="tl" rotWithShape="0">
@@ -13223,9 +13249,7 @@
           </a:prstGeom>
           <a:noFill/>
           <a:ln>
-            <a:solidFill>
-              <a:srgbClr val="00BCA7"/>
-            </a:solidFill>
+            <a:noFill/>
           </a:ln>
           <a:effectLst>
             <a:outerShdw blurRad="292100" dist="76200" dir="2700000" sx="98000" sy="98000" algn="tl" rotWithShape="0">
@@ -13265,7 +13289,7 @@
             <a:r>
               <a:rPr lang="zh-CN" altLang="en-US" sz="1600">
                 <a:solidFill>
-                  <a:srgbClr val="00584E"/>
+                  <a:srgbClr val="000000"/>
                 </a:solidFill>
                 <a:latin typeface="+mj-ea"/>
                 <a:ea typeface="+mj-ea"/>
@@ -13309,22 +13333,20 @@
           <a:gradFill rotWithShape="1">
             <a:gsLst>
               <a:gs pos="0">
-                <a:srgbClr val="EEFFFD">
+                <a:srgbClr val="000000">
                   <a:alpha val="0"/>
                 </a:srgbClr>
               </a:gs>
               <a:gs pos="100000">
-                <a:srgbClr val="00BCA7">
+                <a:srgbClr val="000000">
                   <a:alpha val="0"/>
                 </a:srgbClr>
               </a:gs>
             </a:gsLst>
-            <a:lin scaled="0"/>
+            <a:lin scaled="0" ang="16200000"/>
           </a:gradFill>
           <a:ln>
-            <a:solidFill>
-              <a:srgbClr val="00BCA7"/>
-            </a:solidFill>
+            <a:noFill/>
           </a:ln>
           <a:effectLst>
             <a:outerShdw blurRad="292100" dist="76200" dir="2700000" sx="98000" sy="98000" algn="tl" rotWithShape="0">
@@ -13393,9 +13415,7 @@
           </a:prstGeom>
           <a:noFill/>
           <a:ln>
-            <a:solidFill>
-              <a:srgbClr val="00BCA7"/>
-            </a:solidFill>
+            <a:noFill/>
           </a:ln>
           <a:effectLst>
             <a:outerShdw blurRad="292100" dist="76200" dir="2700000" sx="98000" sy="98000" algn="tl" rotWithShape="0">
@@ -13435,7 +13455,7 @@
             <a:r>
               <a:rPr lang="zh-CN" altLang="en-US" sz="1600">
                 <a:solidFill>
-                  <a:srgbClr val="00584E"/>
+                  <a:srgbClr val="000000"/>
                 </a:solidFill>
                 <a:latin typeface="+mj-ea"/>
                 <a:ea typeface="+mj-ea"/>
@@ -13479,22 +13499,20 @@
           <a:gradFill rotWithShape="1">
             <a:gsLst>
               <a:gs pos="0">
-                <a:srgbClr val="EEFFFD">
+                <a:srgbClr val="000000">
                   <a:alpha val="0"/>
                 </a:srgbClr>
               </a:gs>
               <a:gs pos="100000">
-                <a:srgbClr val="00BCA7">
+                <a:srgbClr val="000000">
                   <a:alpha val="0"/>
                 </a:srgbClr>
               </a:gs>
             </a:gsLst>
-            <a:lin scaled="0"/>
+            <a:lin scaled="0" ang="16200000"/>
           </a:gradFill>
           <a:ln>
-            <a:solidFill>
-              <a:srgbClr val="00BCA7"/>
-            </a:solidFill>
+            <a:noFill/>
           </a:ln>
           <a:effectLst>
             <a:outerShdw blurRad="292100" dist="76200" dir="2700000" sx="98000" sy="98000" algn="tl" rotWithShape="0">
@@ -13563,9 +13581,7 @@
           </a:prstGeom>
           <a:noFill/>
           <a:ln>
-            <a:solidFill>
-              <a:srgbClr val="00BCA7"/>
-            </a:solidFill>
+            <a:noFill/>
           </a:ln>
           <a:effectLst>
             <a:outerShdw blurRad="292100" dist="76200" dir="2700000" sx="98000" sy="98000" algn="tl" rotWithShape="0">
@@ -13605,7 +13621,7 @@
             <a:r>
               <a:rPr lang="zh-CN" altLang="en-US" sz="1600">
                 <a:solidFill>
-                  <a:srgbClr val="00584E"/>
+                  <a:srgbClr val="000000"/>
                 </a:solidFill>
                 <a:latin typeface="+mj-ea"/>
                 <a:ea typeface="+mj-ea"/>
@@ -13649,22 +13665,20 @@
           <a:gradFill rotWithShape="1">
             <a:gsLst>
               <a:gs pos="0">
-                <a:srgbClr val="EEFFFD">
+                <a:srgbClr val="000000">
                   <a:alpha val="0"/>
                 </a:srgbClr>
               </a:gs>
               <a:gs pos="100000">
-                <a:srgbClr val="00BCA7">
+                <a:srgbClr val="000000">
                   <a:alpha val="0"/>
                 </a:srgbClr>
               </a:gs>
             </a:gsLst>
-            <a:lin scaled="0"/>
+            <a:lin scaled="0" ang="16200000"/>
           </a:gradFill>
           <a:ln>
-            <a:solidFill>
-              <a:srgbClr val="00BCA7"/>
-            </a:solidFill>
+            <a:noFill/>
           </a:ln>
           <a:effectLst>
             <a:outerShdw blurRad="292100" dist="76200" dir="2700000" sx="98000" sy="98000" algn="tl" rotWithShape="0">
@@ -13733,9 +13747,7 @@
           </a:prstGeom>
           <a:noFill/>
           <a:ln>
-            <a:solidFill>
-              <a:srgbClr val="00BCA7"/>
-            </a:solidFill>
+            <a:noFill/>
           </a:ln>
           <a:effectLst>
             <a:outerShdw blurRad="292100" dist="76200" dir="2700000" sx="98000" sy="98000" algn="tl" rotWithShape="0">
@@ -13775,7 +13787,7 @@
             <a:r>
               <a:rPr lang="zh-CN" altLang="en-US" sz="1600">
                 <a:solidFill>
-                  <a:srgbClr val="00584E"/>
+                  <a:srgbClr val="000000"/>
                 </a:solidFill>
                 <a:latin typeface="+mj-ea"/>
                 <a:ea typeface="+mj-ea"/>
@@ -13848,7 +13860,7 @@
                   <a:noFill/>
                 </a:ln>
                 <a:solidFill>
-                  <a:srgbClr val="00BCA7"/>
+                  <a:srgbClr val="000000"/>
                 </a:solidFill>
                 <a:effectLst/>
                 <a:uLnTx/>
@@ -13866,7 +13878,7 @@
                   <a:noFill/>
                 </a:ln>
                 <a:solidFill>
-                  <a:srgbClr val="00BCA7"/>
+                  <a:srgbClr val="000000"/>
                 </a:solidFill>
                 <a:effectLst/>
                 <a:uLnTx/>
@@ -13884,7 +13896,7 @@
                   <a:noFill/>
                 </a:ln>
                 <a:solidFill>
-                  <a:srgbClr val="00BCA7"/>
+                  <a:srgbClr val="000000"/>
                 </a:solidFill>
                 <a:effectLst/>
                 <a:uLnTx/>
@@ -13945,7 +13957,7 @@
                   <a:noFill/>
                 </a:ln>
                 <a:solidFill>
-                  <a:srgbClr val="00584E"/>
+                  <a:srgbClr val="000000"/>
                 </a:solidFill>
                 <a:effectLst/>
                 <a:uLnTx/>
@@ -14004,7 +14016,7 @@
                   <a:noFill/>
                 </a:ln>
                 <a:solidFill>
-                  <a:srgbClr val="00584E"/>
+                  <a:srgbClr val="000000"/>
                 </a:solidFill>
                 <a:effectLst/>
                 <a:uLnTx/>
@@ -14063,7 +14075,7 @@
                   <a:noFill/>
                 </a:ln>
                 <a:solidFill>
-                  <a:srgbClr val="00584E"/>
+                  <a:srgbClr val="000000"/>
                 </a:solidFill>
                 <a:effectLst/>
                 <a:uLnTx/>
@@ -14122,7 +14134,7 @@
                   <a:noFill/>
                 </a:ln>
                 <a:solidFill>
-                  <a:srgbClr val="00584E"/>
+                  <a:srgbClr val="000000"/>
                 </a:solidFill>
                 <a:effectLst/>
                 <a:uLnTx/>
@@ -14181,7 +14193,7 @@
                   <a:noFill/>
                 </a:ln>
                 <a:solidFill>
-                  <a:srgbClr val="00584E"/>
+                  <a:srgbClr val="000000"/>
                 </a:solidFill>
                 <a:effectLst/>
                 <a:uLnTx/>
@@ -14240,7 +14252,7 @@
                   <a:noFill/>
                 </a:ln>
                 <a:solidFill>
-                  <a:srgbClr val="00584E"/>
+                  <a:srgbClr val="000000"/>
                 </a:solidFill>
                 <a:effectLst/>
                 <a:uLnTx/>
@@ -14299,7 +14311,7 @@
                   <a:noFill/>
                 </a:ln>
                 <a:solidFill>
-                  <a:srgbClr val="00584E"/>
+                  <a:srgbClr val="000000"/>
                 </a:solidFill>
                 <a:effectLst/>
                 <a:uLnTx/>
@@ -14358,7 +14370,7 @@
                   <a:noFill/>
                 </a:ln>
                 <a:solidFill>
-                  <a:srgbClr val="00584E"/>
+                  <a:srgbClr val="000000"/>
                 </a:solidFill>
                 <a:effectLst/>
                 <a:uLnTx/>

</xml_diff>

<commit_message>
change ways of setting gradient angle
</commit_message>
<xml_diff>
--- a/output/motiongo科技1_new.pptx
+++ b/output/motiongo科技1_new.pptx
@@ -11030,21 +11030,11 @@
               </a:path>
             </a:pathLst>
           </a:custGeom>
-          <a:gradFill rotWithShape="1">
-            <a:gsLst>
-              <a:gs pos="0">
-                <a:srgbClr val="000000">
-                  <a:alpha val="0"/>
-                </a:srgbClr>
-              </a:gs>
-              <a:gs pos="100000">
-                <a:srgbClr val="000000">
-                  <a:alpha val="0"/>
-                </a:srgbClr>
-              </a:gs>
-            </a:gsLst>
-            <a:lin scaled="0" ang="16200000"/>
-          </a:gradFill>
+          <a:solidFill>
+            <a:srgbClr val="00BCA7">
+              <a:alpha val="0"/>
+            </a:srgbClr>
+          </a:solidFill>
           <a:ln>
             <a:noFill/>
           </a:ln>
@@ -11891,21 +11881,11 @@
           <a:prstGeom prst="rect">
             <a:avLst/>
           </a:prstGeom>
-          <a:gradFill rotWithShape="1">
-            <a:gsLst>
-              <a:gs pos="0">
-                <a:srgbClr val="000000">
-                  <a:alpha val="0"/>
-                </a:srgbClr>
-              </a:gs>
-              <a:gs pos="100000">
-                <a:srgbClr val="000000">
-                  <a:alpha val="0"/>
-                </a:srgbClr>
-              </a:gs>
-            </a:gsLst>
-            <a:lin scaled="0" ang="16200000"/>
-          </a:gradFill>
+          <a:solidFill>
+            <a:srgbClr val="00584E">
+              <a:alpha val="0"/>
+            </a:srgbClr>
+          </a:solidFill>
           <a:ln>
             <a:noFill/>
           </a:ln>
@@ -11951,21 +11931,11 @@
               <a:gd name="adj" fmla="val 50000"/>
             </a:avLst>
           </a:prstGeom>
-          <a:gradFill rotWithShape="1">
-            <a:gsLst>
-              <a:gs pos="0">
-                <a:srgbClr val="000000">
-                  <a:alpha val="0"/>
-                </a:srgbClr>
-              </a:gs>
-              <a:gs pos="100000">
-                <a:srgbClr val="000000">
-                  <a:alpha val="0"/>
-                </a:srgbClr>
-              </a:gs>
-            </a:gsLst>
-            <a:lin scaled="0" ang="16200000"/>
-          </a:gradFill>
+          <a:solidFill>
+            <a:srgbClr val="00BCA7">
+              <a:alpha val="0"/>
+            </a:srgbClr>
+          </a:solidFill>
           <a:ln>
             <a:noFill/>
           </a:ln>
@@ -12070,7 +12040,7 @@
             <a:r>
               <a:rPr lang="zh-CN" altLang="en-US" sz="1600">
                 <a:solidFill>
-                  <a:srgbClr val="000000"/>
+                  <a:srgbClr val="00584E"/>
                 </a:solidFill>
                 <a:latin typeface="+mj-ea"/>
                 <a:ea typeface="+mj-ea"/>
@@ -12518,21 +12488,11 @@
           <a:prstGeom prst="ellipse">
             <a:avLst/>
           </a:prstGeom>
-          <a:gradFill rotWithShape="1">
-            <a:gsLst>
-              <a:gs pos="0">
-                <a:srgbClr val="000000">
-                  <a:alpha val="0"/>
-                </a:srgbClr>
-              </a:gs>
-              <a:gs pos="100000">
-                <a:srgbClr val="000000">
-                  <a:alpha val="0"/>
-                </a:srgbClr>
-              </a:gs>
-            </a:gsLst>
-            <a:lin scaled="0" ang="16200000"/>
-          </a:gradFill>
+          <a:solidFill>
+            <a:srgbClr val="00584E">
+              <a:alpha val="0"/>
+            </a:srgbClr>
+          </a:solidFill>
           <a:ln>
             <a:noFill/>
           </a:ln>
@@ -12588,21 +12548,11 @@
           <a:prstGeom prst="ellipse">
             <a:avLst/>
           </a:prstGeom>
-          <a:gradFill rotWithShape="1">
-            <a:gsLst>
-              <a:gs pos="0">
-                <a:srgbClr val="000000">
-                  <a:alpha val="0"/>
-                </a:srgbClr>
-              </a:gs>
-              <a:gs pos="100000">
-                <a:srgbClr val="000000">
-                  <a:alpha val="0"/>
-                </a:srgbClr>
-              </a:gs>
-            </a:gsLst>
-            <a:lin scaled="0" ang="16200000"/>
-          </a:gradFill>
+          <a:solidFill>
+            <a:srgbClr val="00BCA7">
+              <a:alpha val="0"/>
+            </a:srgbClr>
+          </a:solidFill>
           <a:ln>
             <a:noFill/>
           </a:ln>
@@ -12666,21 +12616,11 @@
               <a:gd name="adj" fmla="val 50000"/>
             </a:avLst>
           </a:prstGeom>
-          <a:gradFill rotWithShape="1">
-            <a:gsLst>
-              <a:gs pos="0">
-                <a:srgbClr val="000000">
-                  <a:alpha val="0"/>
-                </a:srgbClr>
-              </a:gs>
-              <a:gs pos="100000">
-                <a:srgbClr val="000000">
-                  <a:alpha val="0"/>
-                </a:srgbClr>
-              </a:gs>
-            </a:gsLst>
-            <a:lin scaled="0" ang="16200000"/>
-          </a:gradFill>
+          <a:solidFill>
+            <a:srgbClr val="00BCA7">
+              <a:alpha val="0"/>
+            </a:srgbClr>
+          </a:solidFill>
           <a:ln>
             <a:noFill/>
           </a:ln>
@@ -12791,7 +12731,7 @@
             <a:r>
               <a:rPr lang="zh-CN" altLang="en-US" sz="1600">
                 <a:solidFill>
-                  <a:srgbClr val="000000"/>
+                  <a:srgbClr val="00584E"/>
                 </a:solidFill>
                 <a:latin typeface="+mj-ea"/>
                 <a:ea typeface="+mj-ea"/>
@@ -12832,21 +12772,11 @@
               <a:gd name="adj" fmla="val 50000"/>
             </a:avLst>
           </a:prstGeom>
-          <a:gradFill rotWithShape="1">
-            <a:gsLst>
-              <a:gs pos="0">
-                <a:srgbClr val="000000">
-                  <a:alpha val="0"/>
-                </a:srgbClr>
-              </a:gs>
-              <a:gs pos="100000">
-                <a:srgbClr val="000000">
-                  <a:alpha val="0"/>
-                </a:srgbClr>
-              </a:gs>
-            </a:gsLst>
-            <a:lin scaled="0" ang="16200000"/>
-          </a:gradFill>
+          <a:solidFill>
+            <a:srgbClr val="00BCA7">
+              <a:alpha val="0"/>
+            </a:srgbClr>
+          </a:solidFill>
           <a:ln>
             <a:noFill/>
           </a:ln>
@@ -12957,7 +12887,7 @@
             <a:r>
               <a:rPr lang="zh-CN" altLang="en-US" sz="1600">
                 <a:solidFill>
-                  <a:srgbClr val="000000"/>
+                  <a:srgbClr val="00584E"/>
                 </a:solidFill>
                 <a:latin typeface="+mj-ea"/>
                 <a:ea typeface="+mj-ea"/>
@@ -12998,21 +12928,11 @@
               <a:gd name="adj" fmla="val 50000"/>
             </a:avLst>
           </a:prstGeom>
-          <a:gradFill rotWithShape="1">
-            <a:gsLst>
-              <a:gs pos="0">
-                <a:srgbClr val="000000">
-                  <a:alpha val="0"/>
-                </a:srgbClr>
-              </a:gs>
-              <a:gs pos="100000">
-                <a:srgbClr val="000000">
-                  <a:alpha val="0"/>
-                </a:srgbClr>
-              </a:gs>
-            </a:gsLst>
-            <a:lin scaled="0" ang="16200000"/>
-          </a:gradFill>
+          <a:solidFill>
+            <a:srgbClr val="00BCA7">
+              <a:alpha val="0"/>
+            </a:srgbClr>
+          </a:solidFill>
           <a:ln>
             <a:noFill/>
           </a:ln>
@@ -13123,7 +13043,7 @@
             <a:r>
               <a:rPr lang="zh-CN" altLang="en-US" sz="1600">
                 <a:solidFill>
-                  <a:srgbClr val="000000"/>
+                  <a:srgbClr val="00584E"/>
                 </a:solidFill>
                 <a:latin typeface="+mj-ea"/>
                 <a:ea typeface="+mj-ea"/>
@@ -13164,21 +13084,11 @@
               <a:gd name="adj" fmla="val 50000"/>
             </a:avLst>
           </a:prstGeom>
-          <a:gradFill rotWithShape="1">
-            <a:gsLst>
-              <a:gs pos="0">
-                <a:srgbClr val="000000">
-                  <a:alpha val="0"/>
-                </a:srgbClr>
-              </a:gs>
-              <a:gs pos="100000">
-                <a:srgbClr val="000000">
-                  <a:alpha val="0"/>
-                </a:srgbClr>
-              </a:gs>
-            </a:gsLst>
-            <a:lin scaled="0" ang="16200000"/>
-          </a:gradFill>
+          <a:solidFill>
+            <a:srgbClr val="00BCA7">
+              <a:alpha val="0"/>
+            </a:srgbClr>
+          </a:solidFill>
           <a:ln>
             <a:noFill/>
           </a:ln>
@@ -13289,7 +13199,7 @@
             <a:r>
               <a:rPr lang="zh-CN" altLang="en-US" sz="1600">
                 <a:solidFill>
-                  <a:srgbClr val="000000"/>
+                  <a:srgbClr val="00584E"/>
                 </a:solidFill>
                 <a:latin typeface="+mj-ea"/>
                 <a:ea typeface="+mj-ea"/>
@@ -13330,21 +13240,11 @@
               <a:gd name="adj" fmla="val 50000"/>
             </a:avLst>
           </a:prstGeom>
-          <a:gradFill rotWithShape="1">
-            <a:gsLst>
-              <a:gs pos="0">
-                <a:srgbClr val="000000">
-                  <a:alpha val="0"/>
-                </a:srgbClr>
-              </a:gs>
-              <a:gs pos="100000">
-                <a:srgbClr val="000000">
-                  <a:alpha val="0"/>
-                </a:srgbClr>
-              </a:gs>
-            </a:gsLst>
-            <a:lin scaled="0" ang="16200000"/>
-          </a:gradFill>
+          <a:solidFill>
+            <a:srgbClr val="00BCA7">
+              <a:alpha val="0"/>
+            </a:srgbClr>
+          </a:solidFill>
           <a:ln>
             <a:noFill/>
           </a:ln>
@@ -13455,7 +13355,7 @@
             <a:r>
               <a:rPr lang="zh-CN" altLang="en-US" sz="1600">
                 <a:solidFill>
-                  <a:srgbClr val="000000"/>
+                  <a:srgbClr val="00584E"/>
                 </a:solidFill>
                 <a:latin typeface="+mj-ea"/>
                 <a:ea typeface="+mj-ea"/>
@@ -13496,21 +13396,11 @@
               <a:gd name="adj" fmla="val 50000"/>
             </a:avLst>
           </a:prstGeom>
-          <a:gradFill rotWithShape="1">
-            <a:gsLst>
-              <a:gs pos="0">
-                <a:srgbClr val="000000">
-                  <a:alpha val="0"/>
-                </a:srgbClr>
-              </a:gs>
-              <a:gs pos="100000">
-                <a:srgbClr val="000000">
-                  <a:alpha val="0"/>
-                </a:srgbClr>
-              </a:gs>
-            </a:gsLst>
-            <a:lin scaled="0" ang="16200000"/>
-          </a:gradFill>
+          <a:solidFill>
+            <a:srgbClr val="00BCA7">
+              <a:alpha val="0"/>
+            </a:srgbClr>
+          </a:solidFill>
           <a:ln>
             <a:noFill/>
           </a:ln>
@@ -13621,7 +13511,7 @@
             <a:r>
               <a:rPr lang="zh-CN" altLang="en-US" sz="1600">
                 <a:solidFill>
-                  <a:srgbClr val="000000"/>
+                  <a:srgbClr val="00584E"/>
                 </a:solidFill>
                 <a:latin typeface="+mj-ea"/>
                 <a:ea typeface="+mj-ea"/>
@@ -13662,21 +13552,11 @@
               <a:gd name="adj" fmla="val 50000"/>
             </a:avLst>
           </a:prstGeom>
-          <a:gradFill rotWithShape="1">
-            <a:gsLst>
-              <a:gs pos="0">
-                <a:srgbClr val="000000">
-                  <a:alpha val="0"/>
-                </a:srgbClr>
-              </a:gs>
-              <a:gs pos="100000">
-                <a:srgbClr val="000000">
-                  <a:alpha val="0"/>
-                </a:srgbClr>
-              </a:gs>
-            </a:gsLst>
-            <a:lin scaled="0" ang="16200000"/>
-          </a:gradFill>
+          <a:solidFill>
+            <a:srgbClr val="00BCA7">
+              <a:alpha val="0"/>
+            </a:srgbClr>
+          </a:solidFill>
           <a:ln>
             <a:noFill/>
           </a:ln>
@@ -13787,7 +13667,7 @@
             <a:r>
               <a:rPr lang="zh-CN" altLang="en-US" sz="1600">
                 <a:solidFill>
-                  <a:srgbClr val="000000"/>
+                  <a:srgbClr val="00584E"/>
                 </a:solidFill>
                 <a:latin typeface="+mj-ea"/>
                 <a:ea typeface="+mj-ea"/>
@@ -13860,7 +13740,7 @@
                   <a:noFill/>
                 </a:ln>
                 <a:solidFill>
-                  <a:srgbClr val="000000"/>
+                  <a:srgbClr val="00BCA7"/>
                 </a:solidFill>
                 <a:effectLst/>
                 <a:uLnTx/>
@@ -13878,7 +13758,7 @@
                   <a:noFill/>
                 </a:ln>
                 <a:solidFill>
-                  <a:srgbClr val="000000"/>
+                  <a:srgbClr val="00BCA7"/>
                 </a:solidFill>
                 <a:effectLst/>
                 <a:uLnTx/>
@@ -13896,7 +13776,7 @@
                   <a:noFill/>
                 </a:ln>
                 <a:solidFill>
-                  <a:srgbClr val="000000"/>
+                  <a:srgbClr val="00BCA7"/>
                 </a:solidFill>
                 <a:effectLst/>
                 <a:uLnTx/>
@@ -13957,7 +13837,7 @@
                   <a:noFill/>
                 </a:ln>
                 <a:solidFill>
-                  <a:srgbClr val="000000"/>
+                  <a:srgbClr val="00584E"/>
                 </a:solidFill>
                 <a:effectLst/>
                 <a:uLnTx/>
@@ -14016,7 +13896,7 @@
                   <a:noFill/>
                 </a:ln>
                 <a:solidFill>
-                  <a:srgbClr val="000000"/>
+                  <a:srgbClr val="00584E"/>
                 </a:solidFill>
                 <a:effectLst/>
                 <a:uLnTx/>
@@ -14075,7 +13955,7 @@
                   <a:noFill/>
                 </a:ln>
                 <a:solidFill>
-                  <a:srgbClr val="000000"/>
+                  <a:srgbClr val="00584E"/>
                 </a:solidFill>
                 <a:effectLst/>
                 <a:uLnTx/>
@@ -14134,7 +14014,7 @@
                   <a:noFill/>
                 </a:ln>
                 <a:solidFill>
-                  <a:srgbClr val="000000"/>
+                  <a:srgbClr val="00584E"/>
                 </a:solidFill>
                 <a:effectLst/>
                 <a:uLnTx/>
@@ -14193,7 +14073,7 @@
                   <a:noFill/>
                 </a:ln>
                 <a:solidFill>
-                  <a:srgbClr val="000000"/>
+                  <a:srgbClr val="00584E"/>
                 </a:solidFill>
                 <a:effectLst/>
                 <a:uLnTx/>
@@ -14252,7 +14132,7 @@
                   <a:noFill/>
                 </a:ln>
                 <a:solidFill>
-                  <a:srgbClr val="000000"/>
+                  <a:srgbClr val="00584E"/>
                 </a:solidFill>
                 <a:effectLst/>
                 <a:uLnTx/>
@@ -14311,7 +14191,7 @@
                   <a:noFill/>
                 </a:ln>
                 <a:solidFill>
-                  <a:srgbClr val="000000"/>
+                  <a:srgbClr val="00584E"/>
                 </a:solidFill>
                 <a:effectLst/>
                 <a:uLnTx/>
@@ -14370,7 +14250,7 @@
                   <a:noFill/>
                 </a:ln>
                 <a:solidFill>
-                  <a:srgbClr val="000000"/>
+                  <a:srgbClr val="00584E"/>
                 </a:solidFill>
                 <a:effectLst/>
                 <a:uLnTx/>

</xml_diff>